<commit_message>
stash for temp work claude
</commit_message>
<xml_diff>
--- a/src/Template 2.1.pptx
+++ b/src/Template 2.1.pptx
@@ -5,7 +5,7 @@
     <p:sldMasterId id="2147483648" r:id="rId1"/>
   </p:sldMasterIdLst>
   <p:notesMasterIdLst>
-    <p:notesMasterId r:id="rId20"/>
+    <p:notesMasterId r:id="rId19"/>
   </p:notesMasterIdLst>
   <p:sldIdLst>
     <p:sldId id="256" r:id="rId2"/>
@@ -23,9 +23,8 @@
     <p:sldId id="948" r:id="rId14"/>
     <p:sldId id="950" r:id="rId15"/>
     <p:sldId id="297" r:id="rId16"/>
-    <p:sldId id="296" r:id="rId17"/>
-    <p:sldId id="941" r:id="rId18"/>
-    <p:sldId id="949" r:id="rId19"/>
+    <p:sldId id="941" r:id="rId17"/>
+    <p:sldId id="949" r:id="rId18"/>
   </p:sldIdLst>
   <p:sldSz cx="12192000" cy="6858000"/>
   <p:notesSz cx="6858000" cy="9144000"/>
@@ -339,7 +338,7 @@
 <file path=ppt/charts/chart1.xml><?xml version="1.0" encoding="utf-8"?>
 <c:chartSpace xmlns:c="http://schemas.openxmlformats.org/drawingml/2006/chart" xmlns:a="http://schemas.openxmlformats.org/drawingml/2006/main" xmlns:r="http://schemas.openxmlformats.org/officeDocument/2006/relationships" xmlns:c16r2="http://schemas.microsoft.com/office/drawing/2015/06/chart">
   <c:date1904 val="0"/>
-  <c:lang val="zh-CN"/>
+  <c:lang val="en-US"/>
   <c:roundedCorners val="0"/>
   <mc:AlternateContent xmlns:mc="http://schemas.openxmlformats.org/markup-compatibility/2006">
     <mc:Choice xmlns:c14="http://schemas.microsoft.com/office/drawing/2007/8/2/chart" Requires="c14">
@@ -677,7 +676,7 @@
 <file path=ppt/charts/chart2.xml><?xml version="1.0" encoding="utf-8"?>
 <c:chartSpace xmlns:c="http://schemas.openxmlformats.org/drawingml/2006/chart" xmlns:a="http://schemas.openxmlformats.org/drawingml/2006/main" xmlns:r="http://schemas.openxmlformats.org/officeDocument/2006/relationships" xmlns:c16r2="http://schemas.microsoft.com/office/drawing/2015/06/chart">
   <c:date1904 val="0"/>
-  <c:lang val="zh-CN"/>
+  <c:lang val="en-US"/>
   <c:roundedCorners val="0"/>
   <mc:AlternateContent xmlns:mc="http://schemas.openxmlformats.org/markup-compatibility/2006">
     <mc:Choice xmlns:c14="http://schemas.microsoft.com/office/drawing/2007/8/2/chart" Requires="c14">
@@ -9334,7 +9333,7 @@
           <a:p>
             <a:fld id="{21DFC0C0-F3C1-46A6-B1E0-38A19114CB16}" type="datetimeFigureOut">
               <a:rPr lang="zh-CN" altLang="en-US" smtClean="0"/>
-              <a:t>2026/2/11</a:t>
+              <a:t>2026/2/18</a:t>
             </a:fld>
             <a:endParaRPr lang="zh-CN" altLang="en-US"/>
           </a:p>
@@ -12118,7 +12117,7 @@
           <a:p>
             <a:fld id="{21DFC0C0-F3C1-46A6-B1E0-38A19114CB16}" type="datetimeFigureOut">
               <a:rPr lang="zh-CN" altLang="en-US" smtClean="0"/>
-              <a:t>2026/2/11</a:t>
+              <a:t>2026/2/18</a:t>
             </a:fld>
             <a:endParaRPr lang="zh-CN" altLang="en-US"/>
           </a:p>
@@ -27662,8 +27661,8 @@
         </p:nvSpPr>
         <p:spPr>
           <a:xfrm>
-            <a:off x="9930614" y="185339"/>
-            <a:ext cx="552069" cy="1556708"/>
+            <a:off x="9840416" y="44624"/>
+            <a:ext cx="773897" cy="1556708"/>
           </a:xfrm>
           <a:prstGeom prst="rect">
             <a:avLst/>
@@ -27709,76 +27708,6 @@
               <a:t>A</a:t>
             </a:r>
             <a:endParaRPr lang="zh-CN" altLang="en-US" sz="7200" b="1" dirty="0">
-              <a:solidFill>
-                <a:schemeClr val="bg1"/>
-              </a:solidFill>
-              <a:latin typeface="Arial" panose="020B0604020202020204" pitchFamily="34" charset="0"/>
-              <a:ea typeface="微软雅黑" panose="020B0503020204020204" pitchFamily="34" charset="-122"/>
-            </a:endParaRPr>
-          </a:p>
-        </p:txBody>
-      </p:sp>
-      <p:sp>
-        <p:nvSpPr>
-          <p:cNvPr id="14" name="矩形 13">
-            <a:extLst>
-              <a:ext uri="{FF2B5EF4-FFF2-40B4-BE49-F238E27FC236}">
-                <a16:creationId xmlns:a16="http://schemas.microsoft.com/office/drawing/2014/main" id="{777F11FC-39D1-14D7-640A-8979FC05C52A}"/>
-              </a:ext>
-            </a:extLst>
-          </p:cNvPr>
-          <p:cNvSpPr/>
-          <p:nvPr/>
-        </p:nvSpPr>
-        <p:spPr>
-          <a:xfrm>
-            <a:off x="10449581" y="375019"/>
-            <a:ext cx="288032" cy="458459"/>
-          </a:xfrm>
-          <a:prstGeom prst="rect">
-            <a:avLst/>
-          </a:prstGeom>
-          <a:noFill/>
-          <a:ln>
-            <a:noFill/>
-          </a:ln>
-        </p:spPr>
-        <p:style>
-          <a:lnRef idx="0">
-            <a:scrgbClr r="0" g="0" b="0"/>
-          </a:lnRef>
-          <a:fillRef idx="0">
-            <a:scrgbClr r="0" g="0" b="0"/>
-          </a:fillRef>
-          <a:effectRef idx="0">
-            <a:scrgbClr r="0" g="0" b="0"/>
-          </a:effectRef>
-          <a:fontRef idx="minor">
-            <a:schemeClr val="lt1"/>
-          </a:fontRef>
-        </p:style>
-        <p:txBody>
-          <a:bodyPr wrap="square">
-            <a:spAutoFit/>
-          </a:bodyPr>
-          <a:lstStyle/>
-          <a:p>
-            <a:pPr algn="ctr">
-              <a:lnSpc>
-                <a:spcPct val="150000"/>
-              </a:lnSpc>
-            </a:pPr>
-            <a:r>
-              <a:rPr lang="en-US" altLang="zh-CN" b="1" dirty="0">
-                <a:solidFill>
-                  <a:schemeClr val="bg1"/>
-                </a:solidFill>
-                <a:latin typeface="微软雅黑" pitchFamily="34" charset="-122"/>
-                <a:ea typeface="微软雅黑" pitchFamily="34" charset="-122"/>
-              </a:rPr>
-              <a:t>-</a:t>
-            </a:r>
-            <a:endParaRPr lang="zh-CN" altLang="en-US" b="1" dirty="0">
               <a:solidFill>
                 <a:schemeClr val="bg1"/>
               </a:solidFill>
@@ -28994,1015 +28923,6 @@
           <a:chExt cx="0" cy="0"/>
         </a:xfrm>
       </p:grpSpPr>
-      <p:cxnSp>
-        <p:nvCxnSpPr>
-          <p:cNvPr id="2" name="直接连接符 1"/>
-          <p:cNvCxnSpPr/>
-          <p:nvPr/>
-        </p:nvCxnSpPr>
-        <p:spPr>
-          <a:xfrm>
-            <a:off x="263352" y="2337973"/>
-            <a:ext cx="0" cy="4365023"/>
-          </a:xfrm>
-          <a:prstGeom prst="line">
-            <a:avLst/>
-          </a:prstGeom>
-          <a:ln w="19050">
-            <a:solidFill>
-              <a:srgbClr val="B01A2B"/>
-            </a:solidFill>
-          </a:ln>
-          <a:effectLst/>
-        </p:spPr>
-        <p:style>
-          <a:lnRef idx="2">
-            <a:schemeClr val="dk1"/>
-          </a:lnRef>
-          <a:fillRef idx="0">
-            <a:schemeClr val="dk1"/>
-          </a:fillRef>
-          <a:effectRef idx="1">
-            <a:schemeClr val="dk1"/>
-          </a:effectRef>
-          <a:fontRef idx="minor">
-            <a:schemeClr val="tx1"/>
-          </a:fontRef>
-        </p:style>
-      </p:cxnSp>
-      <p:cxnSp>
-        <p:nvCxnSpPr>
-          <p:cNvPr id="3" name="直接连接符 2"/>
-          <p:cNvCxnSpPr/>
-          <p:nvPr/>
-        </p:nvCxnSpPr>
-        <p:spPr>
-          <a:xfrm>
-            <a:off x="263352" y="6697621"/>
-            <a:ext cx="11737304" cy="0"/>
-          </a:xfrm>
-          <a:prstGeom prst="line">
-            <a:avLst/>
-          </a:prstGeom>
-          <a:ln w="19050">
-            <a:solidFill>
-              <a:srgbClr val="B01A2B"/>
-            </a:solidFill>
-          </a:ln>
-          <a:effectLst/>
-        </p:spPr>
-        <p:style>
-          <a:lnRef idx="2">
-            <a:schemeClr val="dk1"/>
-          </a:lnRef>
-          <a:fillRef idx="0">
-            <a:schemeClr val="dk1"/>
-          </a:fillRef>
-          <a:effectRef idx="1">
-            <a:schemeClr val="dk1"/>
-          </a:effectRef>
-          <a:fontRef idx="minor">
-            <a:schemeClr val="tx1"/>
-          </a:fontRef>
-        </p:style>
-      </p:cxnSp>
-      <p:cxnSp>
-        <p:nvCxnSpPr>
-          <p:cNvPr id="4" name="直接连接符 3"/>
-          <p:cNvCxnSpPr/>
-          <p:nvPr/>
-        </p:nvCxnSpPr>
-        <p:spPr>
-          <a:xfrm>
-            <a:off x="11986765" y="2420888"/>
-            <a:ext cx="0" cy="4282108"/>
-          </a:xfrm>
-          <a:prstGeom prst="line">
-            <a:avLst/>
-          </a:prstGeom>
-          <a:ln w="19050">
-            <a:solidFill>
-              <a:srgbClr val="B01A2B"/>
-            </a:solidFill>
-          </a:ln>
-          <a:effectLst/>
-        </p:spPr>
-        <p:style>
-          <a:lnRef idx="2">
-            <a:schemeClr val="dk1"/>
-          </a:lnRef>
-          <a:fillRef idx="0">
-            <a:schemeClr val="dk1"/>
-          </a:fillRef>
-          <a:effectRef idx="1">
-            <a:schemeClr val="dk1"/>
-          </a:effectRef>
-          <a:fontRef idx="minor">
-            <a:schemeClr val="tx1"/>
-          </a:fontRef>
-        </p:style>
-      </p:cxnSp>
-      <p:sp>
-        <p:nvSpPr>
-          <p:cNvPr id="5" name="矩形 4"/>
-          <p:cNvSpPr/>
-          <p:nvPr/>
-        </p:nvSpPr>
-        <p:spPr>
-          <a:xfrm>
-            <a:off x="9314885" y="314655"/>
-            <a:ext cx="1843150" cy="1476163"/>
-          </a:xfrm>
-          <a:prstGeom prst="rect">
-            <a:avLst/>
-          </a:prstGeom>
-          <a:solidFill>
-            <a:srgbClr val="B01A2B"/>
-          </a:solidFill>
-          <a:ln>
-            <a:noFill/>
-          </a:ln>
-        </p:spPr>
-        <p:style>
-          <a:lnRef idx="2">
-            <a:schemeClr val="dk1">
-              <a:shade val="50000"/>
-            </a:schemeClr>
-          </a:lnRef>
-          <a:fillRef idx="1">
-            <a:schemeClr val="dk1"/>
-          </a:fillRef>
-          <a:effectRef idx="0">
-            <a:schemeClr val="dk1"/>
-          </a:effectRef>
-          <a:fontRef idx="minor">
-            <a:schemeClr val="lt1"/>
-          </a:fontRef>
-        </p:style>
-        <p:txBody>
-          <a:bodyPr rot="0" spcFirstLastPara="1" vertOverflow="overflow" horzOverflow="overflow" vert="horz" wrap="square" lIns="45719" tIns="45719" rIns="45719" bIns="45719" numCol="1" spcCol="38100" rtlCol="0" anchor="ctr">
-            <a:spAutoFit/>
-          </a:bodyPr>
-          <a:lstStyle/>
-          <a:p>
-            <a:pPr marL="0" marR="0" indent="0" algn="l" defTabSz="457200" rtl="0" fontAlgn="auto" latinLnBrk="0" hangingPunct="0">
-              <a:lnSpc>
-                <a:spcPct val="100000"/>
-              </a:lnSpc>
-              <a:spcBef>
-                <a:spcPts val="0"/>
-              </a:spcBef>
-              <a:spcAft>
-                <a:spcPts val="0"/>
-              </a:spcAft>
-              <a:buClrTx/>
-              <a:buSzTx/>
-              <a:buFontTx/>
-              <a:buNone/>
-            </a:pPr>
-            <a:endParaRPr kumimoji="0" lang="zh-CN" altLang="en-US" sz="1800" b="0" i="0" u="none" strike="noStrike" cap="none" spc="0" normalizeH="0" baseline="0">
-              <a:ln>
-                <a:noFill/>
-              </a:ln>
-              <a:solidFill>
-                <a:srgbClr val="000000"/>
-              </a:solidFill>
-              <a:effectLst/>
-              <a:uFillTx/>
-              <a:latin typeface="Arial" panose="020B0604020202020204"/>
-              <a:ea typeface="Arial" panose="020B0604020202020204"/>
-              <a:cs typeface="Arial" panose="020B0604020202020204"/>
-              <a:sym typeface="Arial" panose="020B0604020202020204"/>
-            </a:endParaRPr>
-          </a:p>
-        </p:txBody>
-      </p:sp>
-      <p:cxnSp>
-        <p:nvCxnSpPr>
-          <p:cNvPr id="6" name="直接连接符 5"/>
-          <p:cNvCxnSpPr/>
-          <p:nvPr/>
-        </p:nvCxnSpPr>
-        <p:spPr>
-          <a:xfrm>
-            <a:off x="9192344" y="188640"/>
-            <a:ext cx="0" cy="6508981"/>
-          </a:xfrm>
-          <a:prstGeom prst="line">
-            <a:avLst/>
-          </a:prstGeom>
-          <a:ln w="19050">
-            <a:solidFill>
-              <a:srgbClr val="B01A2B"/>
-            </a:solidFill>
-          </a:ln>
-          <a:effectLst/>
-        </p:spPr>
-        <p:style>
-          <a:lnRef idx="2">
-            <a:schemeClr val="dk1"/>
-          </a:lnRef>
-          <a:fillRef idx="0">
-            <a:schemeClr val="dk1"/>
-          </a:fillRef>
-          <a:effectRef idx="1">
-            <a:schemeClr val="dk1"/>
-          </a:effectRef>
-          <a:fontRef idx="minor">
-            <a:schemeClr val="tx1"/>
-          </a:fontRef>
-        </p:style>
-      </p:cxnSp>
-      <p:cxnSp>
-        <p:nvCxnSpPr>
-          <p:cNvPr id="7" name="直接连接符 6"/>
-          <p:cNvCxnSpPr/>
-          <p:nvPr/>
-        </p:nvCxnSpPr>
-        <p:spPr>
-          <a:xfrm>
-            <a:off x="263352" y="188640"/>
-            <a:ext cx="11017224" cy="0"/>
-          </a:xfrm>
-          <a:prstGeom prst="line">
-            <a:avLst/>
-          </a:prstGeom>
-          <a:ln w="19050">
-            <a:solidFill>
-              <a:srgbClr val="B01A2B"/>
-            </a:solidFill>
-          </a:ln>
-          <a:effectLst/>
-        </p:spPr>
-        <p:style>
-          <a:lnRef idx="2">
-            <a:schemeClr val="dk1"/>
-          </a:lnRef>
-          <a:fillRef idx="0">
-            <a:schemeClr val="dk1"/>
-          </a:fillRef>
-          <a:effectRef idx="1">
-            <a:schemeClr val="dk1"/>
-          </a:effectRef>
-          <a:fontRef idx="minor">
-            <a:schemeClr val="tx1"/>
-          </a:fontRef>
-        </p:style>
-      </p:cxnSp>
-      <p:cxnSp>
-        <p:nvCxnSpPr>
-          <p:cNvPr id="8" name="直接连接符 7"/>
-          <p:cNvCxnSpPr/>
-          <p:nvPr/>
-        </p:nvCxnSpPr>
-        <p:spPr>
-          <a:xfrm>
-            <a:off x="263352" y="185339"/>
-            <a:ext cx="0" cy="579365"/>
-          </a:xfrm>
-          <a:prstGeom prst="line">
-            <a:avLst/>
-          </a:prstGeom>
-          <a:ln w="19050">
-            <a:solidFill>
-              <a:srgbClr val="B01A2B"/>
-            </a:solidFill>
-          </a:ln>
-          <a:effectLst/>
-        </p:spPr>
-        <p:style>
-          <a:lnRef idx="2">
-            <a:schemeClr val="dk1"/>
-          </a:lnRef>
-          <a:fillRef idx="0">
-            <a:schemeClr val="dk1"/>
-          </a:fillRef>
-          <a:effectRef idx="1">
-            <a:schemeClr val="dk1"/>
-          </a:effectRef>
-          <a:fontRef idx="minor">
-            <a:schemeClr val="tx1"/>
-          </a:fontRef>
-        </p:style>
-      </p:cxnSp>
-      <p:cxnSp>
-        <p:nvCxnSpPr>
-          <p:cNvPr id="9" name="直接连接符 8"/>
-          <p:cNvCxnSpPr/>
-          <p:nvPr/>
-        </p:nvCxnSpPr>
-        <p:spPr>
-          <a:xfrm flipV="1">
-            <a:off x="9192344" y="2415514"/>
-            <a:ext cx="2789094" cy="5374"/>
-          </a:xfrm>
-          <a:prstGeom prst="line">
-            <a:avLst/>
-          </a:prstGeom>
-          <a:ln>
-            <a:solidFill>
-              <a:schemeClr val="bg1"/>
-            </a:solidFill>
-          </a:ln>
-          <a:effectLst/>
-        </p:spPr>
-        <p:style>
-          <a:lnRef idx="2">
-            <a:schemeClr val="dk1"/>
-          </a:lnRef>
-          <a:fillRef idx="0">
-            <a:schemeClr val="dk1"/>
-          </a:fillRef>
-          <a:effectRef idx="1">
-            <a:schemeClr val="dk1"/>
-          </a:effectRef>
-          <a:fontRef idx="minor">
-            <a:schemeClr val="tx1"/>
-          </a:fontRef>
-        </p:style>
-      </p:cxnSp>
-      <p:cxnSp>
-        <p:nvCxnSpPr>
-          <p:cNvPr id="10" name="直接连接符 9"/>
-          <p:cNvCxnSpPr/>
-          <p:nvPr/>
-        </p:nvCxnSpPr>
-        <p:spPr>
-          <a:xfrm>
-            <a:off x="11280576" y="188640"/>
-            <a:ext cx="0" cy="2232248"/>
-          </a:xfrm>
-          <a:prstGeom prst="line">
-            <a:avLst/>
-          </a:prstGeom>
-          <a:ln w="19050">
-            <a:solidFill>
-              <a:srgbClr val="B01A2B"/>
-            </a:solidFill>
-          </a:ln>
-          <a:effectLst/>
-        </p:spPr>
-        <p:style>
-          <a:lnRef idx="2">
-            <a:schemeClr val="dk1"/>
-          </a:lnRef>
-          <a:fillRef idx="0">
-            <a:schemeClr val="dk1"/>
-          </a:fillRef>
-          <a:effectRef idx="1">
-            <a:schemeClr val="dk1"/>
-          </a:effectRef>
-          <a:fontRef idx="minor">
-            <a:schemeClr val="tx1"/>
-          </a:fontRef>
-        </p:style>
-      </p:cxnSp>
-      <p:cxnSp>
-        <p:nvCxnSpPr>
-          <p:cNvPr id="11" name="直接连接符 10"/>
-          <p:cNvCxnSpPr/>
-          <p:nvPr/>
-        </p:nvCxnSpPr>
-        <p:spPr>
-          <a:xfrm>
-            <a:off x="9192344" y="1916832"/>
-            <a:ext cx="2088232" cy="0"/>
-          </a:xfrm>
-          <a:prstGeom prst="line">
-            <a:avLst/>
-          </a:prstGeom>
-          <a:ln w="19050">
-            <a:solidFill>
-              <a:srgbClr val="B01A2B"/>
-            </a:solidFill>
-          </a:ln>
-          <a:effectLst/>
-        </p:spPr>
-        <p:style>
-          <a:lnRef idx="2">
-            <a:schemeClr val="dk1"/>
-          </a:lnRef>
-          <a:fillRef idx="0">
-            <a:schemeClr val="dk1"/>
-          </a:fillRef>
-          <a:effectRef idx="1">
-            <a:schemeClr val="dk1"/>
-          </a:effectRef>
-          <a:fontRef idx="minor">
-            <a:schemeClr val="tx1"/>
-          </a:fontRef>
-        </p:style>
-      </p:cxnSp>
-      <p:cxnSp>
-        <p:nvCxnSpPr>
-          <p:cNvPr id="16" name="直接连接符 15"/>
-          <p:cNvCxnSpPr/>
-          <p:nvPr/>
-        </p:nvCxnSpPr>
-        <p:spPr>
-          <a:xfrm>
-            <a:off x="263352" y="3227063"/>
-            <a:ext cx="8928992" cy="0"/>
-          </a:xfrm>
-          <a:prstGeom prst="line">
-            <a:avLst/>
-          </a:prstGeom>
-          <a:ln w="9525">
-            <a:solidFill>
-              <a:srgbClr val="C00000"/>
-            </a:solidFill>
-            <a:prstDash val="dashDot"/>
-          </a:ln>
-          <a:effectLst/>
-        </p:spPr>
-        <p:style>
-          <a:lnRef idx="2">
-            <a:schemeClr val="dk1"/>
-          </a:lnRef>
-          <a:fillRef idx="0">
-            <a:schemeClr val="dk1"/>
-          </a:fillRef>
-          <a:effectRef idx="1">
-            <a:schemeClr val="dk1"/>
-          </a:effectRef>
-          <a:fontRef idx="minor">
-            <a:schemeClr val="tx1"/>
-          </a:fontRef>
-        </p:style>
-      </p:cxnSp>
-      <p:sp>
-        <p:nvSpPr>
-          <p:cNvPr id="18" name="矩形 17"/>
-          <p:cNvSpPr/>
-          <p:nvPr/>
-        </p:nvSpPr>
-        <p:spPr>
-          <a:xfrm>
-            <a:off x="311218" y="2337973"/>
-            <a:ext cx="2704623" cy="854080"/>
-          </a:xfrm>
-          <a:prstGeom prst="rect">
-            <a:avLst/>
-          </a:prstGeom>
-          <a:ln>
-            <a:noFill/>
-          </a:ln>
-        </p:spPr>
-        <p:txBody>
-          <a:bodyPr wrap="square">
-            <a:spAutoFit/>
-          </a:bodyPr>
-          <a:lstStyle/>
-          <a:p>
-            <a:pPr>
-              <a:lnSpc>
-                <a:spcPct val="150000"/>
-              </a:lnSpc>
-            </a:pPr>
-            <a:r>
-              <a:rPr lang="zh-CN" altLang="en-US" sz="1100" dirty="0">
-                <a:latin typeface="微软雅黑" panose="020B0503020204020204" pitchFamily="34" charset="-122"/>
-                <a:ea typeface="微软雅黑" panose="020B0503020204020204" pitchFamily="34" charset="-122"/>
-              </a:rPr>
-              <a:t>试穿人数：</a:t>
-            </a:r>
-            <a:endParaRPr lang="en-US" altLang="zh-CN" sz="1100" dirty="0">
-              <a:latin typeface="微软雅黑" panose="020B0503020204020204" pitchFamily="34" charset="-122"/>
-              <a:ea typeface="微软雅黑" panose="020B0503020204020204" pitchFamily="34" charset="-122"/>
-            </a:endParaRPr>
-          </a:p>
-          <a:p>
-            <a:pPr>
-              <a:lnSpc>
-                <a:spcPct val="150000"/>
-              </a:lnSpc>
-            </a:pPr>
-            <a:r>
-              <a:rPr lang="zh-CN" altLang="en-US" sz="1100" dirty="0">
-                <a:latin typeface="微软雅黑" panose="020B0503020204020204" pitchFamily="34" charset="-122"/>
-                <a:ea typeface="微软雅黑" panose="020B0503020204020204" pitchFamily="34" charset="-122"/>
-              </a:rPr>
-              <a:t>测试者平均体重：</a:t>
-            </a:r>
-            <a:endParaRPr lang="en-US" altLang="zh-CN" sz="900" dirty="0">
-              <a:latin typeface="微软雅黑" panose="020B0503020204020204" pitchFamily="34" charset="-122"/>
-              <a:ea typeface="微软雅黑" panose="020B0503020204020204" pitchFamily="34" charset="-122"/>
-            </a:endParaRPr>
-          </a:p>
-          <a:p>
-            <a:pPr>
-              <a:lnSpc>
-                <a:spcPct val="150000"/>
-              </a:lnSpc>
-            </a:pPr>
-            <a:r>
-              <a:rPr lang="zh-CN" altLang="en-US" sz="1100" dirty="0">
-                <a:latin typeface="微软雅黑" panose="020B0503020204020204" pitchFamily="34" charset="-122"/>
-                <a:ea typeface="微软雅黑" panose="020B0503020204020204" pitchFamily="34" charset="-122"/>
-              </a:rPr>
-              <a:t>测试者球场定位：</a:t>
-            </a:r>
-          </a:p>
-        </p:txBody>
-      </p:sp>
-      <p:sp>
-        <p:nvSpPr>
-          <p:cNvPr id="20" name="矩形 19"/>
-          <p:cNvSpPr/>
-          <p:nvPr/>
-        </p:nvSpPr>
-        <p:spPr>
-          <a:xfrm>
-            <a:off x="9196387" y="2415514"/>
-            <a:ext cx="2785051" cy="326613"/>
-          </a:xfrm>
-          <a:prstGeom prst="rect">
-            <a:avLst/>
-          </a:prstGeom>
-          <a:solidFill>
-            <a:srgbClr val="B01A2B"/>
-          </a:solidFill>
-          <a:ln>
-            <a:noFill/>
-          </a:ln>
-        </p:spPr>
-        <p:style>
-          <a:lnRef idx="2">
-            <a:schemeClr val="dk1">
-              <a:shade val="50000"/>
-            </a:schemeClr>
-          </a:lnRef>
-          <a:fillRef idx="1">
-            <a:schemeClr val="dk1"/>
-          </a:fillRef>
-          <a:effectRef idx="0">
-            <a:schemeClr val="dk1"/>
-          </a:effectRef>
-          <a:fontRef idx="minor">
-            <a:schemeClr val="lt1"/>
-          </a:fontRef>
-        </p:style>
-        <p:txBody>
-          <a:bodyPr rot="0" spcFirstLastPara="1" vertOverflow="overflow" horzOverflow="overflow" vert="horz" wrap="square" lIns="45719" tIns="45719" rIns="45719" bIns="45719" numCol="1" spcCol="38100" rtlCol="0" anchor="ctr">
-            <a:spAutoFit/>
-          </a:bodyPr>
-          <a:lstStyle/>
-          <a:p>
-            <a:pPr marL="0" marR="0" indent="0" algn="l" defTabSz="457200" rtl="0" fontAlgn="auto" latinLnBrk="0" hangingPunct="0">
-              <a:lnSpc>
-                <a:spcPct val="100000"/>
-              </a:lnSpc>
-              <a:spcBef>
-                <a:spcPts val="0"/>
-              </a:spcBef>
-              <a:spcAft>
-                <a:spcPts val="0"/>
-              </a:spcAft>
-              <a:buClrTx/>
-              <a:buSzTx/>
-              <a:buFontTx/>
-              <a:buNone/>
-            </a:pPr>
-            <a:endParaRPr kumimoji="0" lang="zh-CN" altLang="en-US" sz="1800" b="0" i="0" u="none" strike="noStrike" cap="none" spc="0" normalizeH="0" baseline="0">
-              <a:ln>
-                <a:noFill/>
-              </a:ln>
-              <a:solidFill>
-                <a:srgbClr val="000000"/>
-              </a:solidFill>
-              <a:effectLst/>
-              <a:uFillTx/>
-              <a:latin typeface="Arial" panose="020B0604020202020204"/>
-              <a:ea typeface="Arial" panose="020B0604020202020204"/>
-              <a:cs typeface="Arial" panose="020B0604020202020204"/>
-              <a:sym typeface="Arial" panose="020B0604020202020204"/>
-            </a:endParaRPr>
-          </a:p>
-        </p:txBody>
-      </p:sp>
-      <p:cxnSp>
-        <p:nvCxnSpPr>
-          <p:cNvPr id="33" name="直接连接符 32"/>
-          <p:cNvCxnSpPr/>
-          <p:nvPr/>
-        </p:nvCxnSpPr>
-        <p:spPr>
-          <a:xfrm>
-            <a:off x="5692599" y="3284417"/>
-            <a:ext cx="0" cy="3447692"/>
-          </a:xfrm>
-          <a:prstGeom prst="line">
-            <a:avLst/>
-          </a:prstGeom>
-          <a:ln w="9525">
-            <a:solidFill>
-              <a:srgbClr val="C00000"/>
-            </a:solidFill>
-            <a:prstDash val="dashDot"/>
-          </a:ln>
-          <a:effectLst/>
-        </p:spPr>
-        <p:style>
-          <a:lnRef idx="2">
-            <a:schemeClr val="dk1"/>
-          </a:lnRef>
-          <a:fillRef idx="0">
-            <a:schemeClr val="dk1"/>
-          </a:fillRef>
-          <a:effectRef idx="1">
-            <a:schemeClr val="dk1"/>
-          </a:effectRef>
-          <a:fontRef idx="minor">
-            <a:schemeClr val="tx1"/>
-          </a:fontRef>
-        </p:style>
-      </p:cxnSp>
-      <p:sp>
-        <p:nvSpPr>
-          <p:cNvPr id="41" name="矩形 40"/>
-          <p:cNvSpPr/>
-          <p:nvPr/>
-        </p:nvSpPr>
-        <p:spPr>
-          <a:xfrm>
-            <a:off x="263352" y="192792"/>
-            <a:ext cx="2752489" cy="571912"/>
-          </a:xfrm>
-          <a:prstGeom prst="rect">
-            <a:avLst/>
-          </a:prstGeom>
-          <a:solidFill>
-            <a:srgbClr val="B01A2B"/>
-          </a:solidFill>
-          <a:ln>
-            <a:noFill/>
-          </a:ln>
-        </p:spPr>
-        <p:style>
-          <a:lnRef idx="2">
-            <a:schemeClr val="dk1">
-              <a:shade val="50000"/>
-            </a:schemeClr>
-          </a:lnRef>
-          <a:fillRef idx="1">
-            <a:schemeClr val="dk1"/>
-          </a:fillRef>
-          <a:effectRef idx="0">
-            <a:schemeClr val="dk1"/>
-          </a:effectRef>
-          <a:fontRef idx="minor">
-            <a:schemeClr val="lt1"/>
-          </a:fontRef>
-        </p:style>
-        <p:txBody>
-          <a:bodyPr rot="0" spcFirstLastPara="1" vertOverflow="overflow" horzOverflow="overflow" vert="horz" wrap="square" lIns="45719" tIns="45719" rIns="45719" bIns="45719" numCol="1" spcCol="38100" rtlCol="0" anchor="ctr">
-            <a:spAutoFit/>
-          </a:bodyPr>
-          <a:lstStyle/>
-          <a:p>
-            <a:pPr marL="0" marR="0" indent="0" algn="l" defTabSz="457200" rtl="0" fontAlgn="auto" latinLnBrk="0" hangingPunct="0">
-              <a:lnSpc>
-                <a:spcPct val="100000"/>
-              </a:lnSpc>
-              <a:spcBef>
-                <a:spcPts val="0"/>
-              </a:spcBef>
-              <a:spcAft>
-                <a:spcPts val="0"/>
-              </a:spcAft>
-              <a:buClrTx/>
-              <a:buSzTx/>
-              <a:buFontTx/>
-              <a:buNone/>
-            </a:pPr>
-            <a:endParaRPr kumimoji="0" lang="zh-CN" altLang="en-US" sz="1800" b="0" i="0" u="none" strike="noStrike" cap="none" spc="0" normalizeH="0" baseline="0">
-              <a:ln>
-                <a:noFill/>
-              </a:ln>
-              <a:solidFill>
-                <a:srgbClr val="000000"/>
-              </a:solidFill>
-              <a:effectLst/>
-              <a:uFillTx/>
-              <a:latin typeface="Arial" panose="020B0604020202020204"/>
-              <a:ea typeface="Arial" panose="020B0604020202020204"/>
-              <a:cs typeface="Arial" panose="020B0604020202020204"/>
-              <a:sym typeface="Arial" panose="020B0604020202020204"/>
-            </a:endParaRPr>
-          </a:p>
-        </p:txBody>
-      </p:sp>
-      <p:sp>
-        <p:nvSpPr>
-          <p:cNvPr id="17" name="文本框 16"/>
-          <p:cNvSpPr txBox="1"/>
-          <p:nvPr/>
-        </p:nvSpPr>
-        <p:spPr>
-          <a:xfrm>
-            <a:off x="188387" y="241588"/>
-            <a:ext cx="3200492" cy="461663"/>
-          </a:xfrm>
-          <a:prstGeom prst="rect">
-            <a:avLst/>
-          </a:prstGeom>
-          <a:noFill/>
-          <a:ln>
-            <a:noFill/>
-          </a:ln>
-        </p:spPr>
-        <p:style>
-          <a:lnRef idx="2">
-            <a:schemeClr val="dk1">
-              <a:shade val="50000"/>
-            </a:schemeClr>
-          </a:lnRef>
-          <a:fillRef idx="1">
-            <a:schemeClr val="dk1"/>
-          </a:fillRef>
-          <a:effectRef idx="0">
-            <a:schemeClr val="dk1"/>
-          </a:effectRef>
-          <a:fontRef idx="minor">
-            <a:schemeClr val="lt1"/>
-          </a:fontRef>
-        </p:style>
-        <p:txBody>
-          <a:bodyPr rot="0" spcFirstLastPara="1" vertOverflow="overflow" horzOverflow="overflow" vert="horz" wrap="square" lIns="45719" tIns="45719" rIns="45719" bIns="45719" numCol="1" spcCol="38100" rtlCol="0" anchor="t">
-            <a:spAutoFit/>
-          </a:bodyPr>
-          <a:lstStyle/>
-          <a:p>
-            <a:pPr defTabSz="457200" hangingPunct="0"/>
-            <a:r>
-              <a:rPr lang="zh-CN" altLang="en-US" sz="2400" b="1" dirty="0">
-                <a:solidFill>
-                  <a:schemeClr val="bg1"/>
-                </a:solidFill>
-                <a:effectLst>
-                  <a:outerShdw blurRad="38100" dist="38100" dir="2700000" algn="tl">
-                    <a:srgbClr val="000000">
-                      <a:alpha val="43137"/>
-                    </a:srgbClr>
-                  </a:outerShdw>
-                </a:effectLst>
-                <a:latin typeface="微软雅黑" pitchFamily="34" charset="-122"/>
-                <a:ea typeface="微软雅黑" pitchFamily="34" charset="-122"/>
-              </a:rPr>
-              <a:t>‘鞋款名称’</a:t>
-            </a:r>
-            <a:endParaRPr kumimoji="0" lang="zh-CN" altLang="en-US" sz="400" b="1" i="0" u="none" strike="noStrike" cap="none" spc="0" normalizeH="0" baseline="0" dirty="0">
-              <a:ln>
-                <a:noFill/>
-              </a:ln>
-              <a:solidFill>
-                <a:schemeClr val="bg1"/>
-              </a:solidFill>
-              <a:effectLst>
-                <a:outerShdw blurRad="38100" dist="38100" dir="2700000" algn="tl">
-                  <a:srgbClr val="000000">
-                    <a:alpha val="43137"/>
-                  </a:srgbClr>
-                </a:outerShdw>
-              </a:effectLst>
-              <a:uFillTx/>
-              <a:latin typeface="楷体" panose="02010609060101010101" pitchFamily="49" charset="-122"/>
-              <a:ea typeface="楷体" panose="02010609060101010101" pitchFamily="49" charset="-122"/>
-              <a:sym typeface="Arial"/>
-            </a:endParaRPr>
-          </a:p>
-        </p:txBody>
-      </p:sp>
-      <p:cxnSp>
-        <p:nvCxnSpPr>
-          <p:cNvPr id="42" name="直接连接符 41"/>
-          <p:cNvCxnSpPr/>
-          <p:nvPr/>
-        </p:nvCxnSpPr>
-        <p:spPr>
-          <a:xfrm>
-            <a:off x="3015841" y="185339"/>
-            <a:ext cx="0" cy="1812349"/>
-          </a:xfrm>
-          <a:prstGeom prst="line">
-            <a:avLst/>
-          </a:prstGeom>
-          <a:ln w="19050">
-            <a:solidFill>
-              <a:srgbClr val="B01A2B"/>
-            </a:solidFill>
-          </a:ln>
-          <a:effectLst/>
-        </p:spPr>
-        <p:style>
-          <a:lnRef idx="2">
-            <a:schemeClr val="dk1"/>
-          </a:lnRef>
-          <a:fillRef idx="0">
-            <a:schemeClr val="dk1"/>
-          </a:fillRef>
-          <a:effectRef idx="1">
-            <a:schemeClr val="dk1"/>
-          </a:effectRef>
-          <a:fontRef idx="minor">
-            <a:schemeClr val="tx1"/>
-          </a:fontRef>
-        </p:style>
-      </p:cxnSp>
-      <p:pic>
-        <p:nvPicPr>
-          <p:cNvPr id="75" name="图片 74"/>
-          <p:cNvPicPr>
-            <a:picLocks noChangeAspect="1"/>
-          </p:cNvPicPr>
-          <p:nvPr/>
-        </p:nvPicPr>
-        <p:blipFill>
-          <a:blip r:embed="rId2"/>
-          <a:stretch>
-            <a:fillRect/>
-          </a:stretch>
-        </p:blipFill>
-        <p:spPr>
-          <a:xfrm>
-            <a:off x="103870" y="3115693"/>
-            <a:ext cx="379660" cy="404154"/>
-          </a:xfrm>
-          <a:prstGeom prst="rect">
-            <a:avLst/>
-          </a:prstGeom>
-        </p:spPr>
-      </p:pic>
-      <p:pic>
-        <p:nvPicPr>
-          <p:cNvPr id="76" name="图片 75"/>
-          <p:cNvPicPr>
-            <a:picLocks noChangeAspect="1"/>
-          </p:cNvPicPr>
-          <p:nvPr/>
-        </p:nvPicPr>
-        <p:blipFill>
-          <a:blip r:embed="rId3"/>
-          <a:stretch>
-            <a:fillRect/>
-          </a:stretch>
-        </p:blipFill>
-        <p:spPr>
-          <a:xfrm>
-            <a:off x="5531111" y="3148091"/>
-            <a:ext cx="379660" cy="404154"/>
-          </a:xfrm>
-          <a:prstGeom prst="rect">
-            <a:avLst/>
-          </a:prstGeom>
-        </p:spPr>
-      </p:pic>
-      <p:sp>
-        <p:nvSpPr>
-          <p:cNvPr id="71" name="矩形 70"/>
-          <p:cNvSpPr/>
-          <p:nvPr/>
-        </p:nvSpPr>
-        <p:spPr>
-          <a:xfrm>
-            <a:off x="9196387" y="4553306"/>
-            <a:ext cx="2785051" cy="326613"/>
-          </a:xfrm>
-          <a:prstGeom prst="rect">
-            <a:avLst/>
-          </a:prstGeom>
-          <a:solidFill>
-            <a:srgbClr val="B01A2B"/>
-          </a:solidFill>
-          <a:ln>
-            <a:noFill/>
-          </a:ln>
-        </p:spPr>
-        <p:style>
-          <a:lnRef idx="2">
-            <a:schemeClr val="dk1">
-              <a:shade val="50000"/>
-            </a:schemeClr>
-          </a:lnRef>
-          <a:fillRef idx="1">
-            <a:schemeClr val="dk1"/>
-          </a:fillRef>
-          <a:effectRef idx="0">
-            <a:schemeClr val="dk1"/>
-          </a:effectRef>
-          <a:fontRef idx="minor">
-            <a:schemeClr val="lt1"/>
-          </a:fontRef>
-        </p:style>
-        <p:txBody>
-          <a:bodyPr rot="0" spcFirstLastPara="1" vertOverflow="overflow" horzOverflow="overflow" vert="horz" wrap="square" lIns="45719" tIns="45719" rIns="45719" bIns="45719" numCol="1" spcCol="38100" rtlCol="0" anchor="ctr">
-            <a:spAutoFit/>
-          </a:bodyPr>
-          <a:lstStyle/>
-          <a:p>
-            <a:pPr marL="0" marR="0" indent="0" algn="l" defTabSz="457200" rtl="0" fontAlgn="auto" latinLnBrk="0" hangingPunct="0">
-              <a:lnSpc>
-                <a:spcPct val="100000"/>
-              </a:lnSpc>
-              <a:spcBef>
-                <a:spcPts val="0"/>
-              </a:spcBef>
-              <a:spcAft>
-                <a:spcPts val="0"/>
-              </a:spcAft>
-              <a:buClrTx/>
-              <a:buSzTx/>
-              <a:buFontTx/>
-              <a:buNone/>
-            </a:pPr>
-            <a:endParaRPr kumimoji="0" lang="zh-CN" altLang="en-US" sz="1800" b="0" i="0" u="none" strike="noStrike" cap="none" spc="0" normalizeH="0" baseline="0">
-              <a:ln>
-                <a:noFill/>
-              </a:ln>
-              <a:solidFill>
-                <a:srgbClr val="000000"/>
-              </a:solidFill>
-              <a:effectLst/>
-              <a:uFillTx/>
-              <a:latin typeface="Arial" panose="020B0604020202020204"/>
-              <a:ea typeface="Arial" panose="020B0604020202020204"/>
-              <a:cs typeface="Arial" panose="020B0604020202020204"/>
-              <a:sym typeface="Arial" panose="020B0604020202020204"/>
-            </a:endParaRPr>
-          </a:p>
-        </p:txBody>
-      </p:sp>
-      <p:sp>
-        <p:nvSpPr>
-          <p:cNvPr id="15" name="矩形 14"/>
-          <p:cNvSpPr/>
-          <p:nvPr/>
-        </p:nvSpPr>
-        <p:spPr>
-          <a:xfrm>
-            <a:off x="2409648" y="595529"/>
-            <a:ext cx="692818" cy="215444"/>
-          </a:xfrm>
-          <a:prstGeom prst="rect">
-            <a:avLst/>
-          </a:prstGeom>
-        </p:spPr>
-        <p:txBody>
-          <a:bodyPr wrap="none">
-            <a:spAutoFit/>
-          </a:bodyPr>
-          <a:lstStyle/>
-          <a:p>
-            <a:r>
-              <a:rPr lang="en-US" altLang="zh-CN" sz="800" b="1" dirty="0">
-                <a:solidFill>
-                  <a:schemeClr val="bg1"/>
-                </a:solidFill>
-                <a:latin typeface="等线" panose="02010600030101010101" pitchFamily="2" charset="-122"/>
-                <a:ea typeface="等线" panose="02010600030101010101" pitchFamily="2" charset="-122"/>
-              </a:rPr>
-              <a:t>First round</a:t>
-            </a:r>
-            <a:endParaRPr lang="zh-CN" altLang="en-US" sz="800" b="1" dirty="0">
-              <a:solidFill>
-                <a:schemeClr val="bg1"/>
-              </a:solidFill>
-              <a:latin typeface="等线" panose="02010600030101010101" pitchFamily="2" charset="-122"/>
-              <a:ea typeface="等线" panose="02010600030101010101" pitchFamily="2" charset="-122"/>
-            </a:endParaRPr>
-          </a:p>
-        </p:txBody>
-      </p:sp>
-    </p:spTree>
-    <p:extLst>
-      <p:ext uri="{BB962C8B-B14F-4D97-AF65-F5344CB8AC3E}">
-        <p14:creationId xmlns:p14="http://schemas.microsoft.com/office/powerpoint/2010/main" val="1301422027"/>
-      </p:ext>
-    </p:extLst>
-  </p:cSld>
-  <p:clrMapOvr>
-    <a:masterClrMapping/>
-  </p:clrMapOvr>
-</p:sld>
-</file>
-
-<file path=ppt/slides/slide17.xml><?xml version="1.0" encoding="utf-8"?>
-<p:sld xmlns:a="http://schemas.openxmlformats.org/drawingml/2006/main" xmlns:r="http://schemas.openxmlformats.org/officeDocument/2006/relationships" xmlns:p="http://schemas.openxmlformats.org/presentationml/2006/main">
-  <p:cSld>
-    <p:spTree>
-      <p:nvGrpSpPr>
-        <p:cNvPr id="1" name=""/>
-        <p:cNvGrpSpPr/>
-        <p:nvPr/>
-      </p:nvGrpSpPr>
-      <p:grpSpPr>
-        <a:xfrm>
-          <a:off x="0" y="0"/>
-          <a:ext cx="0" cy="0"/>
-          <a:chOff x="0" y="0"/>
-          <a:chExt cx="0" cy="0"/>
-        </a:xfrm>
-      </p:grpSpPr>
       <p:sp>
         <p:nvSpPr>
           <p:cNvPr id="10" name="矩形 9"/>
@@ -33909,7 +32829,7 @@
 </p:sld>
 </file>
 
-<file path=ppt/slides/slide18.xml><?xml version="1.0" encoding="utf-8"?>
+<file path=ppt/slides/slide17.xml><?xml version="1.0" encoding="utf-8"?>
 <p:sld xmlns:a="http://schemas.openxmlformats.org/drawingml/2006/main" xmlns:r="http://schemas.openxmlformats.org/officeDocument/2006/relationships" xmlns:p="http://schemas.openxmlformats.org/presentationml/2006/main">
   <p:cSld>
     <p:spTree>

</xml_diff>